<commit_message>
working on the algorithm
</commit_message>
<xml_diff>
--- a/pysal/contrib/points/tests/img_making.pptx
+++ b/pysal/contrib/points/tests/img_making.pptx
@@ -7,7 +7,8 @@
   <p:sldIdLst>
     <p:sldId id="256" r:id="rId2"/>
     <p:sldId id="257" r:id="rId3"/>
-    <p:sldId id="258" r:id="rId4"/>
+    <p:sldId id="259" r:id="rId4"/>
+    <p:sldId id="258" r:id="rId5"/>
   </p:sldIdLst>
   <p:sldSz cx="12192000" cy="6858000"/>
   <p:notesSz cx="6858000" cy="9144000"/>
@@ -240,7 +241,7 @@
           <a:p>
             <a:fld id="{2C34BA10-CDF1-4854-A230-1AC6C81CA25B}" type="datetimeFigureOut">
               <a:rPr lang="en-US" smtClean="0"/>
-              <a:t>4/21/2016</a:t>
+              <a:t>4/21/16</a:t>
             </a:fld>
             <a:endParaRPr lang="en-US"/>
           </a:p>
@@ -410,7 +411,7 @@
           <a:p>
             <a:fld id="{2C34BA10-CDF1-4854-A230-1AC6C81CA25B}" type="datetimeFigureOut">
               <a:rPr lang="en-US" smtClean="0"/>
-              <a:t>4/21/2016</a:t>
+              <a:t>4/21/16</a:t>
             </a:fld>
             <a:endParaRPr lang="en-US"/>
           </a:p>
@@ -590,7 +591,7 @@
           <a:p>
             <a:fld id="{2C34BA10-CDF1-4854-A230-1AC6C81CA25B}" type="datetimeFigureOut">
               <a:rPr lang="en-US" smtClean="0"/>
-              <a:t>4/21/2016</a:t>
+              <a:t>4/21/16</a:t>
             </a:fld>
             <a:endParaRPr lang="en-US"/>
           </a:p>
@@ -760,7 +761,7 @@
           <a:p>
             <a:fld id="{2C34BA10-CDF1-4854-A230-1AC6C81CA25B}" type="datetimeFigureOut">
               <a:rPr lang="en-US" smtClean="0"/>
-              <a:t>4/21/2016</a:t>
+              <a:t>4/21/16</a:t>
             </a:fld>
             <a:endParaRPr lang="en-US"/>
           </a:p>
@@ -1006,7 +1007,7 @@
           <a:p>
             <a:fld id="{2C34BA10-CDF1-4854-A230-1AC6C81CA25B}" type="datetimeFigureOut">
               <a:rPr lang="en-US" smtClean="0"/>
-              <a:t>4/21/2016</a:t>
+              <a:t>4/21/16</a:t>
             </a:fld>
             <a:endParaRPr lang="en-US"/>
           </a:p>
@@ -1238,7 +1239,7 @@
           <a:p>
             <a:fld id="{2C34BA10-CDF1-4854-A230-1AC6C81CA25B}" type="datetimeFigureOut">
               <a:rPr lang="en-US" smtClean="0"/>
-              <a:t>4/21/2016</a:t>
+              <a:t>4/21/16</a:t>
             </a:fld>
             <a:endParaRPr lang="en-US"/>
           </a:p>
@@ -1605,7 +1606,7 @@
           <a:p>
             <a:fld id="{2C34BA10-CDF1-4854-A230-1AC6C81CA25B}" type="datetimeFigureOut">
               <a:rPr lang="en-US" smtClean="0"/>
-              <a:t>4/21/2016</a:t>
+              <a:t>4/21/16</a:t>
             </a:fld>
             <a:endParaRPr lang="en-US"/>
           </a:p>
@@ -1723,7 +1724,7 @@
           <a:p>
             <a:fld id="{2C34BA10-CDF1-4854-A230-1AC6C81CA25B}" type="datetimeFigureOut">
               <a:rPr lang="en-US" smtClean="0"/>
-              <a:t>4/21/2016</a:t>
+              <a:t>4/21/16</a:t>
             </a:fld>
             <a:endParaRPr lang="en-US"/>
           </a:p>
@@ -1818,7 +1819,7 @@
           <a:p>
             <a:fld id="{2C34BA10-CDF1-4854-A230-1AC6C81CA25B}" type="datetimeFigureOut">
               <a:rPr lang="en-US" smtClean="0"/>
-              <a:t>4/21/2016</a:t>
+              <a:t>4/21/16</a:t>
             </a:fld>
             <a:endParaRPr lang="en-US"/>
           </a:p>
@@ -2095,7 +2096,7 @@
           <a:p>
             <a:fld id="{2C34BA10-CDF1-4854-A230-1AC6C81CA25B}" type="datetimeFigureOut">
               <a:rPr lang="en-US" smtClean="0"/>
-              <a:t>4/21/2016</a:t>
+              <a:t>4/21/16</a:t>
             </a:fld>
             <a:endParaRPr lang="en-US"/>
           </a:p>
@@ -2348,7 +2349,7 @@
           <a:p>
             <a:fld id="{2C34BA10-CDF1-4854-A230-1AC6C81CA25B}" type="datetimeFigureOut">
               <a:rPr lang="en-US" smtClean="0"/>
-              <a:t>4/21/2016</a:t>
+              <a:t>4/21/16</a:t>
             </a:fld>
             <a:endParaRPr lang="en-US"/>
           </a:p>
@@ -2561,7 +2562,7 @@
           <a:p>
             <a:fld id="{2C34BA10-CDF1-4854-A230-1AC6C81CA25B}" type="datetimeFigureOut">
               <a:rPr lang="en-US" smtClean="0"/>
-              <a:t>4/21/2016</a:t>
+              <a:t>4/21/16</a:t>
             </a:fld>
             <a:endParaRPr lang="en-US"/>
           </a:p>
@@ -5207,10 +5208,775 @@
   <p:clrMapOvr>
     <a:masterClrMapping/>
   </p:clrMapOvr>
+  <p:timing>
+    <p:tnLst>
+      <p:par>
+        <p:cTn xmlns:p14="http://schemas.microsoft.com/office/powerpoint/2010/main" id="1" dur="indefinite" restart="never" nodeType="tmRoot"/>
+      </p:par>
+    </p:tnLst>
+  </p:timing>
 </p:sld>
 </file>
 
 <file path=ppt/slides/slide3.xml><?xml version="1.0" encoding="utf-8"?>
+<p:sld xmlns:a="http://schemas.openxmlformats.org/drawingml/2006/main" xmlns:r="http://schemas.openxmlformats.org/officeDocument/2006/relationships" xmlns:p="http://schemas.openxmlformats.org/presentationml/2006/main">
+  <p:cSld>
+    <p:spTree>
+      <p:nvGrpSpPr>
+        <p:cNvPr id="1" name=""/>
+        <p:cNvGrpSpPr/>
+        <p:nvPr/>
+      </p:nvGrpSpPr>
+      <p:grpSpPr>
+        <a:xfrm>
+          <a:off x="0" y="0"/>
+          <a:ext cx="0" cy="0"/>
+          <a:chOff x="0" y="0"/>
+          <a:chExt cx="0" cy="0"/>
+        </a:xfrm>
+      </p:grpSpPr>
+      <p:grpSp>
+        <p:nvGrpSpPr>
+          <p:cNvPr id="26" name="Group 25"/>
+          <p:cNvGrpSpPr/>
+          <p:nvPr/>
+        </p:nvGrpSpPr>
+        <p:grpSpPr>
+          <a:xfrm>
+            <a:off x="2661920" y="795872"/>
+            <a:ext cx="5957138" cy="2526641"/>
+            <a:chOff x="2661920" y="795872"/>
+            <a:chExt cx="5957138" cy="2526641"/>
+          </a:xfrm>
+        </p:grpSpPr>
+        <p:sp>
+          <p:nvSpPr>
+            <p:cNvPr id="2" name="Rectangle 1"/>
+            <p:cNvSpPr/>
+            <p:nvPr/>
+          </p:nvSpPr>
+          <p:spPr>
+            <a:xfrm>
+              <a:off x="2963333" y="1168400"/>
+              <a:ext cx="2543387" cy="1788160"/>
+            </a:xfrm>
+            <a:prstGeom prst="rect">
+              <a:avLst/>
+            </a:prstGeom>
+            <a:noFill/>
+            <a:ln>
+              <a:solidFill>
+                <a:srgbClr val="FF0000"/>
+              </a:solidFill>
+            </a:ln>
+          </p:spPr>
+          <p:style>
+            <a:lnRef idx="1">
+              <a:schemeClr val="accent1"/>
+            </a:lnRef>
+            <a:fillRef idx="3">
+              <a:schemeClr val="accent1"/>
+            </a:fillRef>
+            <a:effectRef idx="2">
+              <a:schemeClr val="accent1"/>
+            </a:effectRef>
+            <a:fontRef idx="minor">
+              <a:schemeClr val="lt1"/>
+            </a:fontRef>
+          </p:style>
+          <p:txBody>
+            <a:bodyPr rtlCol="0" anchor="ctr"/>
+            <a:lstStyle/>
+            <a:p>
+              <a:pPr algn="ctr"/>
+              <a:endParaRPr lang="en-US"/>
+            </a:p>
+          </p:txBody>
+        </p:sp>
+        <p:cxnSp>
+          <p:nvCxnSpPr>
+            <p:cNvPr id="4" name="Straight Connector 3"/>
+            <p:cNvCxnSpPr>
+              <a:stCxn id="2" idx="1"/>
+              <a:endCxn id="2" idx="3"/>
+            </p:cNvCxnSpPr>
+            <p:nvPr/>
+          </p:nvCxnSpPr>
+          <p:spPr>
+            <a:xfrm>
+              <a:off x="2963333" y="2062480"/>
+              <a:ext cx="2543387" cy="0"/>
+            </a:xfrm>
+            <a:prstGeom prst="line">
+              <a:avLst/>
+            </a:prstGeom>
+            <a:ln>
+              <a:solidFill>
+                <a:srgbClr val="008000"/>
+              </a:solidFill>
+              <a:prstDash val="dash"/>
+            </a:ln>
+          </p:spPr>
+          <p:style>
+            <a:lnRef idx="2">
+              <a:schemeClr val="accent1"/>
+            </a:lnRef>
+            <a:fillRef idx="0">
+              <a:schemeClr val="accent1"/>
+            </a:fillRef>
+            <a:effectRef idx="1">
+              <a:schemeClr val="accent1"/>
+            </a:effectRef>
+            <a:fontRef idx="minor">
+              <a:schemeClr val="tx1"/>
+            </a:fontRef>
+          </p:style>
+        </p:cxnSp>
+        <p:cxnSp>
+          <p:nvCxnSpPr>
+            <p:cNvPr id="6" name="Straight Connector 5"/>
+            <p:cNvCxnSpPr>
+              <a:stCxn id="2" idx="0"/>
+              <a:endCxn id="2" idx="2"/>
+            </p:cNvCxnSpPr>
+            <p:nvPr/>
+          </p:nvCxnSpPr>
+          <p:spPr>
+            <a:xfrm>
+              <a:off x="4235027" y="1168400"/>
+              <a:ext cx="0" cy="1788160"/>
+            </a:xfrm>
+            <a:prstGeom prst="line">
+              <a:avLst/>
+            </a:prstGeom>
+            <a:ln>
+              <a:solidFill>
+                <a:schemeClr val="accent5">
+                  <a:lumMod val="75000"/>
+                </a:schemeClr>
+              </a:solidFill>
+              <a:prstDash val="dash"/>
+            </a:ln>
+          </p:spPr>
+          <p:style>
+            <a:lnRef idx="2">
+              <a:schemeClr val="accent1"/>
+            </a:lnRef>
+            <a:fillRef idx="0">
+              <a:schemeClr val="accent1"/>
+            </a:fillRef>
+            <a:effectRef idx="1">
+              <a:schemeClr val="accent1"/>
+            </a:effectRef>
+            <a:fontRef idx="minor">
+              <a:schemeClr val="tx1"/>
+            </a:fontRef>
+          </p:style>
+        </p:cxnSp>
+        <p:sp>
+          <p:nvSpPr>
+            <p:cNvPr id="8" name="TextBox 7"/>
+            <p:cNvSpPr txBox="1"/>
+            <p:nvPr/>
+          </p:nvSpPr>
+          <p:spPr>
+            <a:xfrm>
+              <a:off x="2661920" y="2225040"/>
+              <a:ext cx="301660" cy="369332"/>
+            </a:xfrm>
+            <a:prstGeom prst="rect">
+              <a:avLst/>
+            </a:prstGeom>
+            <a:noFill/>
+          </p:spPr>
+          <p:txBody>
+            <a:bodyPr wrap="none" rtlCol="0">
+              <a:spAutoFit/>
+            </a:bodyPr>
+            <a:lstStyle/>
+            <a:p>
+              <a:r>
+                <a:rPr lang="en-US" dirty="0" smtClean="0"/>
+                <a:t>1</a:t>
+              </a:r>
+              <a:endParaRPr lang="en-US" dirty="0"/>
+            </a:p>
+          </p:txBody>
+        </p:sp>
+        <p:sp>
+          <p:nvSpPr>
+            <p:cNvPr id="9" name="TextBox 8"/>
+            <p:cNvSpPr txBox="1"/>
+            <p:nvPr/>
+          </p:nvSpPr>
+          <p:spPr>
+            <a:xfrm>
+              <a:off x="2661920" y="1419019"/>
+              <a:ext cx="301660" cy="369332"/>
+            </a:xfrm>
+            <a:prstGeom prst="rect">
+              <a:avLst/>
+            </a:prstGeom>
+            <a:noFill/>
+          </p:spPr>
+          <p:txBody>
+            <a:bodyPr wrap="none" rtlCol="0">
+              <a:spAutoFit/>
+            </a:bodyPr>
+            <a:lstStyle/>
+            <a:p>
+              <a:r>
+                <a:rPr lang="en-US" dirty="0" smtClean="0"/>
+                <a:t>2</a:t>
+              </a:r>
+              <a:endParaRPr lang="en-US" dirty="0"/>
+            </a:p>
+          </p:txBody>
+        </p:sp>
+        <p:sp>
+          <p:nvSpPr>
+            <p:cNvPr id="10" name="TextBox 9"/>
+            <p:cNvSpPr txBox="1"/>
+            <p:nvPr/>
+          </p:nvSpPr>
+          <p:spPr>
+            <a:xfrm>
+              <a:off x="3491653" y="795872"/>
+              <a:ext cx="301660" cy="369332"/>
+            </a:xfrm>
+            <a:prstGeom prst="rect">
+              <a:avLst/>
+            </a:prstGeom>
+            <a:noFill/>
+          </p:spPr>
+          <p:txBody>
+            <a:bodyPr wrap="none" rtlCol="0">
+              <a:spAutoFit/>
+            </a:bodyPr>
+            <a:lstStyle/>
+            <a:p>
+              <a:r>
+                <a:rPr lang="en-US" dirty="0"/>
+                <a:t>3</a:t>
+              </a:r>
+            </a:p>
+          </p:txBody>
+        </p:sp>
+        <p:sp>
+          <p:nvSpPr>
+            <p:cNvPr id="11" name="TextBox 10"/>
+            <p:cNvSpPr txBox="1"/>
+            <p:nvPr/>
+          </p:nvSpPr>
+          <p:spPr>
+            <a:xfrm>
+              <a:off x="4731175" y="795872"/>
+              <a:ext cx="301660" cy="369332"/>
+            </a:xfrm>
+            <a:prstGeom prst="rect">
+              <a:avLst/>
+            </a:prstGeom>
+            <a:noFill/>
+          </p:spPr>
+          <p:txBody>
+            <a:bodyPr wrap="none" rtlCol="0">
+              <a:spAutoFit/>
+            </a:bodyPr>
+            <a:lstStyle/>
+            <a:p>
+              <a:r>
+                <a:rPr lang="en-US" dirty="0"/>
+                <a:t>4</a:t>
+              </a:r>
+            </a:p>
+          </p:txBody>
+        </p:sp>
+        <p:sp>
+          <p:nvSpPr>
+            <p:cNvPr id="12" name="TextBox 11"/>
+            <p:cNvSpPr txBox="1"/>
+            <p:nvPr/>
+          </p:nvSpPr>
+          <p:spPr>
+            <a:xfrm>
+              <a:off x="5513494" y="1419018"/>
+              <a:ext cx="301660" cy="369332"/>
+            </a:xfrm>
+            <a:prstGeom prst="rect">
+              <a:avLst/>
+            </a:prstGeom>
+            <a:noFill/>
+          </p:spPr>
+          <p:txBody>
+            <a:bodyPr wrap="none" rtlCol="0">
+              <a:spAutoFit/>
+            </a:bodyPr>
+            <a:lstStyle/>
+            <a:p>
+              <a:r>
+                <a:rPr lang="en-US" dirty="0"/>
+                <a:t>5</a:t>
+              </a:r>
+            </a:p>
+          </p:txBody>
+        </p:sp>
+        <p:sp>
+          <p:nvSpPr>
+            <p:cNvPr id="13" name="TextBox 12"/>
+            <p:cNvSpPr txBox="1"/>
+            <p:nvPr/>
+          </p:nvSpPr>
+          <p:spPr>
+            <a:xfrm>
+              <a:off x="5513494" y="2225045"/>
+              <a:ext cx="301660" cy="369332"/>
+            </a:xfrm>
+            <a:prstGeom prst="rect">
+              <a:avLst/>
+            </a:prstGeom>
+            <a:noFill/>
+          </p:spPr>
+          <p:txBody>
+            <a:bodyPr wrap="none" rtlCol="0">
+              <a:spAutoFit/>
+            </a:bodyPr>
+            <a:lstStyle/>
+            <a:p>
+              <a:r>
+                <a:rPr lang="en-US" dirty="0" smtClean="0"/>
+                <a:t>6</a:t>
+              </a:r>
+              <a:endParaRPr lang="en-US" dirty="0"/>
+            </a:p>
+          </p:txBody>
+        </p:sp>
+        <p:sp>
+          <p:nvSpPr>
+            <p:cNvPr id="14" name="TextBox 13"/>
+            <p:cNvSpPr txBox="1"/>
+            <p:nvPr/>
+          </p:nvSpPr>
+          <p:spPr>
+            <a:xfrm>
+              <a:off x="4741334" y="2953181"/>
+              <a:ext cx="301660" cy="369332"/>
+            </a:xfrm>
+            <a:prstGeom prst="rect">
+              <a:avLst/>
+            </a:prstGeom>
+            <a:noFill/>
+          </p:spPr>
+          <p:txBody>
+            <a:bodyPr wrap="none" rtlCol="0">
+              <a:spAutoFit/>
+            </a:bodyPr>
+            <a:lstStyle/>
+            <a:p>
+              <a:r>
+                <a:rPr lang="en-US" dirty="0"/>
+                <a:t>7</a:t>
+              </a:r>
+            </a:p>
+          </p:txBody>
+        </p:sp>
+        <p:sp>
+          <p:nvSpPr>
+            <p:cNvPr id="15" name="TextBox 14"/>
+            <p:cNvSpPr txBox="1"/>
+            <p:nvPr/>
+          </p:nvSpPr>
+          <p:spPr>
+            <a:xfrm>
+              <a:off x="3491654" y="2953180"/>
+              <a:ext cx="301660" cy="369332"/>
+            </a:xfrm>
+            <a:prstGeom prst="rect">
+              <a:avLst/>
+            </a:prstGeom>
+            <a:noFill/>
+          </p:spPr>
+          <p:txBody>
+            <a:bodyPr wrap="none" rtlCol="0">
+              <a:spAutoFit/>
+            </a:bodyPr>
+            <a:lstStyle/>
+            <a:p>
+              <a:r>
+                <a:rPr lang="en-US" dirty="0" smtClean="0"/>
+                <a:t>8</a:t>
+              </a:r>
+              <a:endParaRPr lang="en-US" dirty="0"/>
+            </a:p>
+          </p:txBody>
+        </p:sp>
+        <p:sp>
+          <p:nvSpPr>
+            <p:cNvPr id="3" name="TextBox 2"/>
+            <p:cNvSpPr txBox="1"/>
+            <p:nvPr/>
+          </p:nvSpPr>
+          <p:spPr>
+            <a:xfrm>
+              <a:off x="3342640" y="2296160"/>
+              <a:ext cx="530915" cy="369332"/>
+            </a:xfrm>
+            <a:prstGeom prst="rect">
+              <a:avLst/>
+            </a:prstGeom>
+            <a:noFill/>
+          </p:spPr>
+          <p:txBody>
+            <a:bodyPr wrap="none" rtlCol="0">
+              <a:spAutoFit/>
+            </a:bodyPr>
+            <a:lstStyle/>
+            <a:p>
+              <a:r>
+                <a:rPr lang="en-US" dirty="0" smtClean="0">
+                  <a:solidFill>
+                    <a:srgbClr val="0000FF"/>
+                  </a:solidFill>
+                </a:rPr>
+                <a:t>L_B</a:t>
+              </a:r>
+            </a:p>
+          </p:txBody>
+        </p:sp>
+        <p:sp>
+          <p:nvSpPr>
+            <p:cNvPr id="16" name="TextBox 15"/>
+            <p:cNvSpPr txBox="1"/>
+            <p:nvPr/>
+          </p:nvSpPr>
+          <p:spPr>
+            <a:xfrm>
+              <a:off x="4622800" y="2296160"/>
+              <a:ext cx="556563" cy="369332"/>
+            </a:xfrm>
+            <a:prstGeom prst="rect">
+              <a:avLst/>
+            </a:prstGeom>
+            <a:noFill/>
+          </p:spPr>
+          <p:txBody>
+            <a:bodyPr wrap="none" rtlCol="0">
+              <a:spAutoFit/>
+            </a:bodyPr>
+            <a:lstStyle/>
+            <a:p>
+              <a:r>
+                <a:rPr lang="en-US" dirty="0">
+                  <a:solidFill>
+                    <a:srgbClr val="0000FF"/>
+                  </a:solidFill>
+                </a:rPr>
+                <a:t>R</a:t>
+              </a:r>
+              <a:r>
+                <a:rPr lang="en-US" dirty="0" smtClean="0">
+                  <a:solidFill>
+                    <a:srgbClr val="0000FF"/>
+                  </a:solidFill>
+                </a:rPr>
+                <a:t>_B</a:t>
+              </a:r>
+            </a:p>
+          </p:txBody>
+        </p:sp>
+        <p:sp>
+          <p:nvSpPr>
+            <p:cNvPr id="17" name="TextBox 16"/>
+            <p:cNvSpPr txBox="1"/>
+            <p:nvPr/>
+          </p:nvSpPr>
+          <p:spPr>
+            <a:xfrm>
+              <a:off x="3342640" y="1412240"/>
+              <a:ext cx="518091" cy="369332"/>
+            </a:xfrm>
+            <a:prstGeom prst="rect">
+              <a:avLst/>
+            </a:prstGeom>
+            <a:noFill/>
+          </p:spPr>
+          <p:txBody>
+            <a:bodyPr wrap="none" rtlCol="0">
+              <a:spAutoFit/>
+            </a:bodyPr>
+            <a:lstStyle/>
+            <a:p>
+              <a:r>
+                <a:rPr lang="en-US" dirty="0" smtClean="0">
+                  <a:solidFill>
+                    <a:srgbClr val="0000FF"/>
+                  </a:solidFill>
+                </a:rPr>
+                <a:t>L_T</a:t>
+              </a:r>
+            </a:p>
+          </p:txBody>
+        </p:sp>
+        <p:sp>
+          <p:nvSpPr>
+            <p:cNvPr id="18" name="TextBox 17"/>
+            <p:cNvSpPr txBox="1"/>
+            <p:nvPr/>
+          </p:nvSpPr>
+          <p:spPr>
+            <a:xfrm>
+              <a:off x="4622800" y="1412240"/>
+              <a:ext cx="543739" cy="369332"/>
+            </a:xfrm>
+            <a:prstGeom prst="rect">
+              <a:avLst/>
+            </a:prstGeom>
+            <a:noFill/>
+          </p:spPr>
+          <p:txBody>
+            <a:bodyPr wrap="none" rtlCol="0">
+              <a:spAutoFit/>
+            </a:bodyPr>
+            <a:lstStyle/>
+            <a:p>
+              <a:r>
+                <a:rPr lang="en-US" dirty="0" smtClean="0">
+                  <a:solidFill>
+                    <a:srgbClr val="0000FF"/>
+                  </a:solidFill>
+                </a:rPr>
+                <a:t>R_T</a:t>
+              </a:r>
+            </a:p>
+          </p:txBody>
+        </p:sp>
+        <p:sp>
+          <p:nvSpPr>
+            <p:cNvPr id="19" name="Rectangle 18"/>
+            <p:cNvSpPr/>
+            <p:nvPr/>
+          </p:nvSpPr>
+          <p:spPr>
+            <a:xfrm>
+              <a:off x="6112933" y="1107440"/>
+              <a:ext cx="501227" cy="213360"/>
+            </a:xfrm>
+            <a:prstGeom prst="rect">
+              <a:avLst/>
+            </a:prstGeom>
+            <a:noFill/>
+            <a:ln>
+              <a:solidFill>
+                <a:srgbClr val="FF0000"/>
+              </a:solidFill>
+            </a:ln>
+          </p:spPr>
+          <p:style>
+            <a:lnRef idx="1">
+              <a:schemeClr val="accent1"/>
+            </a:lnRef>
+            <a:fillRef idx="3">
+              <a:schemeClr val="accent1"/>
+            </a:fillRef>
+            <a:effectRef idx="2">
+              <a:schemeClr val="accent1"/>
+            </a:effectRef>
+            <a:fontRef idx="minor">
+              <a:schemeClr val="lt1"/>
+            </a:fontRef>
+          </p:style>
+          <p:txBody>
+            <a:bodyPr rtlCol="0" anchor="ctr"/>
+            <a:lstStyle/>
+            <a:p>
+              <a:pPr algn="ctr"/>
+              <a:endParaRPr lang="en-US"/>
+            </a:p>
+          </p:txBody>
+        </p:sp>
+        <p:sp>
+          <p:nvSpPr>
+            <p:cNvPr id="20" name="TextBox 19"/>
+            <p:cNvSpPr txBox="1"/>
+            <p:nvPr/>
+          </p:nvSpPr>
+          <p:spPr>
+            <a:xfrm>
+              <a:off x="6651414" y="1012618"/>
+              <a:ext cx="1967644" cy="369332"/>
+            </a:xfrm>
+            <a:prstGeom prst="rect">
+              <a:avLst/>
+            </a:prstGeom>
+            <a:noFill/>
+          </p:spPr>
+          <p:txBody>
+            <a:bodyPr wrap="none" rtlCol="0">
+              <a:spAutoFit/>
+            </a:bodyPr>
+            <a:lstStyle/>
+            <a:p>
+              <a:r>
+                <a:rPr lang="en-US" dirty="0" smtClean="0"/>
+                <a:t>Cell boundary lines</a:t>
+              </a:r>
+              <a:endParaRPr lang="en-US" dirty="0"/>
+            </a:p>
+          </p:txBody>
+        </p:sp>
+        <p:sp>
+          <p:nvSpPr>
+            <p:cNvPr id="5" name="Rectangle 4"/>
+            <p:cNvSpPr/>
+            <p:nvPr/>
+          </p:nvSpPr>
+          <p:spPr>
+            <a:xfrm>
+              <a:off x="6651414" y="1432516"/>
+              <a:ext cx="1272779" cy="369332"/>
+            </a:xfrm>
+            <a:prstGeom prst="rect">
+              <a:avLst/>
+            </a:prstGeom>
+          </p:spPr>
+          <p:txBody>
+            <a:bodyPr wrap="none">
+              <a:spAutoFit/>
+            </a:bodyPr>
+            <a:lstStyle/>
+            <a:p>
+              <a:r>
+                <a:rPr lang="en-US" dirty="0" err="1"/>
+                <a:t>split_line_h</a:t>
+              </a:r>
+              <a:endParaRPr lang="en-US" dirty="0"/>
+            </a:p>
+          </p:txBody>
+        </p:sp>
+        <p:sp>
+          <p:nvSpPr>
+            <p:cNvPr id="21" name="Rectangle 20"/>
+            <p:cNvSpPr/>
+            <p:nvPr/>
+          </p:nvSpPr>
+          <p:spPr>
+            <a:xfrm>
+              <a:off x="6651414" y="1852414"/>
+              <a:ext cx="1255760" cy="369332"/>
+            </a:xfrm>
+            <a:prstGeom prst="rect">
+              <a:avLst/>
+            </a:prstGeom>
+          </p:spPr>
+          <p:txBody>
+            <a:bodyPr wrap="none">
+              <a:spAutoFit/>
+            </a:bodyPr>
+            <a:lstStyle/>
+            <a:p>
+              <a:r>
+                <a:rPr lang="en-US" dirty="0" err="1" smtClean="0"/>
+                <a:t>split_line_v</a:t>
+              </a:r>
+              <a:endParaRPr lang="en-US" dirty="0"/>
+            </a:p>
+          </p:txBody>
+        </p:sp>
+        <p:cxnSp>
+          <p:nvCxnSpPr>
+            <p:cNvPr id="22" name="Straight Connector 21"/>
+            <p:cNvCxnSpPr/>
+            <p:nvPr/>
+          </p:nvCxnSpPr>
+          <p:spPr>
+            <a:xfrm>
+              <a:off x="6123093" y="1656080"/>
+              <a:ext cx="541867" cy="0"/>
+            </a:xfrm>
+            <a:prstGeom prst="line">
+              <a:avLst/>
+            </a:prstGeom>
+            <a:ln>
+              <a:solidFill>
+                <a:srgbClr val="008000"/>
+              </a:solidFill>
+              <a:prstDash val="dash"/>
+            </a:ln>
+          </p:spPr>
+          <p:style>
+            <a:lnRef idx="2">
+              <a:schemeClr val="accent1"/>
+            </a:lnRef>
+            <a:fillRef idx="0">
+              <a:schemeClr val="accent1"/>
+            </a:fillRef>
+            <a:effectRef idx="1">
+              <a:schemeClr val="accent1"/>
+            </a:effectRef>
+            <a:fontRef idx="minor">
+              <a:schemeClr val="tx1"/>
+            </a:fontRef>
+          </p:style>
+        </p:cxnSp>
+        <p:cxnSp>
+          <p:nvCxnSpPr>
+            <p:cNvPr id="24" name="Straight Connector 23"/>
+            <p:cNvCxnSpPr/>
+            <p:nvPr/>
+          </p:nvCxnSpPr>
+          <p:spPr>
+            <a:xfrm>
+              <a:off x="6358467" y="1859280"/>
+              <a:ext cx="0" cy="345440"/>
+            </a:xfrm>
+            <a:prstGeom prst="line">
+              <a:avLst/>
+            </a:prstGeom>
+            <a:ln>
+              <a:solidFill>
+                <a:schemeClr val="accent5">
+                  <a:lumMod val="75000"/>
+                </a:schemeClr>
+              </a:solidFill>
+              <a:prstDash val="dash"/>
+            </a:ln>
+          </p:spPr>
+          <p:style>
+            <a:lnRef idx="2">
+              <a:schemeClr val="accent1"/>
+            </a:lnRef>
+            <a:fillRef idx="0">
+              <a:schemeClr val="accent1"/>
+            </a:fillRef>
+            <a:effectRef idx="1">
+              <a:schemeClr val="accent1"/>
+            </a:effectRef>
+            <a:fontRef idx="minor">
+              <a:schemeClr val="tx1"/>
+            </a:fontRef>
+          </p:style>
+        </p:cxnSp>
+      </p:grpSp>
+    </p:spTree>
+    <p:extLst>
+      <p:ext uri="{BB962C8B-B14F-4D97-AF65-F5344CB8AC3E}">
+        <p14:creationId xmlns:p14="http://schemas.microsoft.com/office/powerpoint/2010/main" val="2002516722"/>
+      </p:ext>
+    </p:extLst>
+  </p:cSld>
+  <p:clrMapOvr>
+    <a:masterClrMapping/>
+  </p:clrMapOvr>
+  <p:timing>
+    <p:tnLst>
+      <p:par>
+        <p:cTn xmlns:p14="http://schemas.microsoft.com/office/powerpoint/2010/main" id="1" dur="indefinite" restart="never" nodeType="tmRoot"/>
+      </p:par>
+    </p:tnLst>
+  </p:timing>
+</p:sld>
+</file>
+
+<file path=ppt/slides/slide4.xml><?xml version="1.0" encoding="utf-8"?>
 <p:sld xmlns:a="http://schemas.openxmlformats.org/drawingml/2006/main" xmlns:r="http://schemas.openxmlformats.org/officeDocument/2006/relationships" xmlns:p="http://schemas.openxmlformats.org/presentationml/2006/main">
   <p:cSld>
     <p:spTree>
@@ -7396,6 +8162,13 @@
   <p:clrMapOvr>
     <a:masterClrMapping/>
   </p:clrMapOvr>
+  <p:timing>
+    <p:tnLst>
+      <p:par>
+        <p:cTn xmlns:p14="http://schemas.microsoft.com/office/powerpoint/2010/main" id="1" dur="indefinite" restart="never" nodeType="tmRoot"/>
+      </p:par>
+    </p:tnLst>
+  </p:timing>
 </p:sld>
 </file>
 
@@ -7442,7 +8215,7 @@
     </a:clrScheme>
     <a:fontScheme name="Office">
       <a:majorFont>
-        <a:latin typeface="Calibri Light" panose="020F0302020204030204"/>
+        <a:latin typeface="Calibri Light"/>
         <a:ea typeface=""/>
         <a:cs typeface=""/>
         <a:font script="Jpan" typeface="ＭＳ Ｐゴシック"/>
@@ -7477,7 +8250,7 @@
         <a:font script="Geor" typeface="Sylfaen"/>
       </a:majorFont>
       <a:minorFont>
-        <a:latin typeface="Calibri" panose="020F0502020204030204"/>
+        <a:latin typeface="Calibri"/>
         <a:ea typeface=""/>
         <a:cs typeface=""/>
         <a:font script="Jpan" typeface="ＭＳ Ｐゴシック"/>
@@ -7654,7 +8427,7 @@
   <a:extraClrSchemeLst/>
   <a:extLst>
     <a:ext uri="{05A4C25C-085E-4340-85A3-A5531E510DB2}">
-      <thm15:themeFamily xmlns:thm15="http://schemas.microsoft.com/office/thememl/2012/main" name="Office Theme" id="{62F939B6-93AF-4DB8-9C6B-D6C7DFDC589F}" vid="{4A3C46E8-61CC-4603-A589-7422A47A8E4A}"/>
+      <thm15:themeFamily xmlns="" xmlns:thm15="http://schemas.microsoft.com/office/thememl/2012/main" name="Office Theme" id="{62F939B6-93AF-4DB8-9C6B-D6C7DFDC589F}" vid="{4A3C46E8-61CC-4603-A589-7422A47A8E4A}"/>
     </a:ext>
   </a:extLst>
 </a:theme>

</xml_diff>